<commit_message>
updates to detecting burst event
</commit_message>
<xml_diff>
--- a/slides/discoSlides.pptx
+++ b/slides/discoSlides.pptx
@@ -7,7 +7,6 @@
   <p:sldIdLst>
     <p:sldId id="257" r:id="rId2"/>
     <p:sldId id="258" r:id="rId3"/>
-    <p:sldId id="260" r:id="rId4"/>
   </p:sldIdLst>
   <p:sldSz cx="9144000" cy="6858000" type="screen4x3"/>
   <p:notesSz cx="6858000" cy="9144000"/>
@@ -290,7 +289,7 @@
           <a:p>
             <a:fld id="{8203570B-465F-4F4F-9FD4-A69A4DE271A3}" type="datetimeFigureOut">
               <a:rPr lang="en-US" smtClean="0"/>
-              <a:t>7/25/16</a:t>
+              <a:t>7/26/16</a:t>
             </a:fld>
             <a:endParaRPr lang="en-US"/>
           </a:p>
@@ -460,7 +459,7 @@
           <a:p>
             <a:fld id="{8203570B-465F-4F4F-9FD4-A69A4DE271A3}" type="datetimeFigureOut">
               <a:rPr lang="en-US" smtClean="0"/>
-              <a:t>7/25/16</a:t>
+              <a:t>7/26/16</a:t>
             </a:fld>
             <a:endParaRPr lang="en-US"/>
           </a:p>
@@ -640,7 +639,7 @@
           <a:p>
             <a:fld id="{8203570B-465F-4F4F-9FD4-A69A4DE271A3}" type="datetimeFigureOut">
               <a:rPr lang="en-US" smtClean="0"/>
-              <a:t>7/25/16</a:t>
+              <a:t>7/26/16</a:t>
             </a:fld>
             <a:endParaRPr lang="en-US"/>
           </a:p>
@@ -810,7 +809,7 @@
           <a:p>
             <a:fld id="{8203570B-465F-4F4F-9FD4-A69A4DE271A3}" type="datetimeFigureOut">
               <a:rPr lang="en-US" smtClean="0"/>
-              <a:t>7/25/16</a:t>
+              <a:t>7/26/16</a:t>
             </a:fld>
             <a:endParaRPr lang="en-US"/>
           </a:p>
@@ -1056,7 +1055,7 @@
           <a:p>
             <a:fld id="{8203570B-465F-4F4F-9FD4-A69A4DE271A3}" type="datetimeFigureOut">
               <a:rPr lang="en-US" smtClean="0"/>
-              <a:t>7/25/16</a:t>
+              <a:t>7/26/16</a:t>
             </a:fld>
             <a:endParaRPr lang="en-US"/>
           </a:p>
@@ -1344,7 +1343,7 @@
           <a:p>
             <a:fld id="{8203570B-465F-4F4F-9FD4-A69A4DE271A3}" type="datetimeFigureOut">
               <a:rPr lang="en-US" smtClean="0"/>
-              <a:t>7/25/16</a:t>
+              <a:t>7/26/16</a:t>
             </a:fld>
             <a:endParaRPr lang="en-US"/>
           </a:p>
@@ -1766,7 +1765,7 @@
           <a:p>
             <a:fld id="{8203570B-465F-4F4F-9FD4-A69A4DE271A3}" type="datetimeFigureOut">
               <a:rPr lang="en-US" smtClean="0"/>
-              <a:t>7/25/16</a:t>
+              <a:t>7/26/16</a:t>
             </a:fld>
             <a:endParaRPr lang="en-US"/>
           </a:p>
@@ -1884,7 +1883,7 @@
           <a:p>
             <a:fld id="{8203570B-465F-4F4F-9FD4-A69A4DE271A3}" type="datetimeFigureOut">
               <a:rPr lang="en-US" smtClean="0"/>
-              <a:t>7/25/16</a:t>
+              <a:t>7/26/16</a:t>
             </a:fld>
             <a:endParaRPr lang="en-US"/>
           </a:p>
@@ -1979,7 +1978,7 @@
           <a:p>
             <a:fld id="{8203570B-465F-4F4F-9FD4-A69A4DE271A3}" type="datetimeFigureOut">
               <a:rPr lang="en-US" smtClean="0"/>
-              <a:t>7/25/16</a:t>
+              <a:t>7/26/16</a:t>
             </a:fld>
             <a:endParaRPr lang="en-US"/>
           </a:p>
@@ -2256,7 +2255,7 @@
           <a:p>
             <a:fld id="{8203570B-465F-4F4F-9FD4-A69A4DE271A3}" type="datetimeFigureOut">
               <a:rPr lang="en-US" smtClean="0"/>
-              <a:t>7/25/16</a:t>
+              <a:t>7/26/16</a:t>
             </a:fld>
             <a:endParaRPr lang="en-US"/>
           </a:p>
@@ -2509,7 +2508,7 @@
           <a:p>
             <a:fld id="{8203570B-465F-4F4F-9FD4-A69A4DE271A3}" type="datetimeFigureOut">
               <a:rPr lang="en-US" smtClean="0"/>
-              <a:t>7/25/16</a:t>
+              <a:t>7/26/16</a:t>
             </a:fld>
             <a:endParaRPr lang="en-US"/>
           </a:p>
@@ -2722,7 +2721,7 @@
           <a:p>
             <a:fld id="{8203570B-465F-4F4F-9FD4-A69A4DE271A3}" type="datetimeFigureOut">
               <a:rPr lang="en-US" smtClean="0"/>
-              <a:t>7/25/16</a:t>
+              <a:t>7/26/16</a:t>
             </a:fld>
             <a:endParaRPr lang="en-US"/>
           </a:p>
@@ -3233,40 +3232,36 @@
           </a:p>
           <a:p>
             <a:r>
-              <a:rPr lang="en-US" smtClean="0"/>
+              <a:rPr lang="en-US" dirty="0" smtClean="0"/>
               <a:t>Methodology</a:t>
             </a:r>
+          </a:p>
+          <a:p>
+            <a:pPr lvl="1"/>
+            <a:r>
+              <a:rPr lang="en-US" dirty="0" err="1" smtClean="0"/>
+              <a:t>Klienberg</a:t>
+            </a:r>
+            <a:endParaRPr lang="en-US" dirty="0"/>
+          </a:p>
+          <a:p>
+            <a:pPr lvl="1"/>
+            <a:r>
+              <a:rPr lang="en-US" dirty="0" smtClean="0"/>
+              <a:t>Data </a:t>
+            </a:r>
+            <a:r>
+              <a:rPr lang="en-US" dirty="0" err="1" smtClean="0"/>
+              <a:t>deaggregation</a:t>
+            </a:r>
+            <a:endParaRPr lang="en-US" smtClean="0"/>
+          </a:p>
+          <a:p>
+            <a:pPr lvl="1"/>
             <a:endParaRPr lang="en-US" dirty="0" smtClean="0"/>
           </a:p>
           <a:p>
             <a:pPr lvl="1"/>
-            <a:r>
-              <a:rPr lang="en-US" dirty="0" smtClean="0"/>
-              <a:t>Target Selection</a:t>
-            </a:r>
-          </a:p>
-          <a:p>
-            <a:pPr lvl="1"/>
-            <a:r>
-              <a:rPr lang="en-US" dirty="0" smtClean="0"/>
-              <a:t>Probe Selection</a:t>
-            </a:r>
-            <a:endParaRPr lang="en-US" dirty="0"/>
-          </a:p>
-          <a:p>
-            <a:pPr lvl="1"/>
-            <a:r>
-              <a:rPr lang="en-US" dirty="0" smtClean="0"/>
-              <a:t>Running Measurements</a:t>
-            </a:r>
-            <a:endParaRPr lang="en-US" dirty="0"/>
-          </a:p>
-          <a:p>
-            <a:pPr lvl="1"/>
-            <a:r>
-              <a:rPr lang="en-US" dirty="0" smtClean="0"/>
-              <a:t>CBG</a:t>
-            </a:r>
             <a:endParaRPr lang="en-US" dirty="0"/>
           </a:p>
         </p:txBody>
@@ -3298,158 +3293,6 @@
     <p:extLst>
       <p:ext uri="{BB962C8B-B14F-4D97-AF65-F5344CB8AC3E}">
         <p14:creationId xmlns:p14="http://schemas.microsoft.com/office/powerpoint/2010/main" val="87283877"/>
-      </p:ext>
-    </p:extLst>
-  </p:cSld>
-  <p:clrMapOvr>
-    <a:masterClrMapping/>
-  </p:clrMapOvr>
-  <p:timing>
-    <p:tnLst>
-      <p:par>
-        <p:cTn xmlns:p14="http://schemas.microsoft.com/office/powerpoint/2010/main" id="1" dur="indefinite" restart="never" nodeType="tmRoot"/>
-      </p:par>
-    </p:tnLst>
-  </p:timing>
-</p:sld>
-</file>
-
-<file path=ppt/slides/slide3.xml><?xml version="1.0" encoding="utf-8"?>
-<p:sld xmlns:a="http://schemas.openxmlformats.org/drawingml/2006/main" xmlns:r="http://schemas.openxmlformats.org/officeDocument/2006/relationships" xmlns:p="http://schemas.openxmlformats.org/presentationml/2006/main">
-  <p:cSld>
-    <p:spTree>
-      <p:nvGrpSpPr>
-        <p:cNvPr id="1" name=""/>
-        <p:cNvGrpSpPr/>
-        <p:nvPr/>
-      </p:nvGrpSpPr>
-      <p:grpSpPr>
-        <a:xfrm>
-          <a:off x="0" y="0"/>
-          <a:ext cx="0" cy="0"/>
-          <a:chOff x="0" y="0"/>
-          <a:chExt cx="0" cy="0"/>
-        </a:xfrm>
-      </p:grpSpPr>
-      <p:sp>
-        <p:nvSpPr>
-          <p:cNvPr id="2" name="Title 1"/>
-          <p:cNvSpPr>
-            <a:spLocks noGrp="1"/>
-          </p:cNvSpPr>
-          <p:nvPr>
-            <p:ph type="title"/>
-          </p:nvPr>
-        </p:nvSpPr>
-        <p:spPr/>
-        <p:txBody>
-          <a:bodyPr/>
-          <a:lstStyle/>
-          <a:p>
-            <a:r>
-              <a:rPr lang="en-US" dirty="0" smtClean="0"/>
-              <a:t>Use Routing Topology</a:t>
-            </a:r>
-            <a:endParaRPr lang="en-US" dirty="0"/>
-          </a:p>
-        </p:txBody>
-      </p:sp>
-      <p:sp>
-        <p:nvSpPr>
-          <p:cNvPr id="3" name="Content Placeholder 2"/>
-          <p:cNvSpPr>
-            <a:spLocks noGrp="1"/>
-          </p:cNvSpPr>
-          <p:nvPr>
-            <p:ph idx="1"/>
-          </p:nvPr>
-        </p:nvSpPr>
-        <p:spPr>
-          <a:xfrm>
-            <a:off x="539434" y="5218210"/>
-            <a:ext cx="8229600" cy="1049351"/>
-          </a:xfrm>
-        </p:spPr>
-        <p:txBody>
-          <a:bodyPr>
-            <a:normAutofit fontScale="92500" lnSpcReduction="20000"/>
-          </a:bodyPr>
-          <a:lstStyle/>
-          <a:p>
-            <a:endParaRPr lang="en-US" sz="2400" dirty="0" smtClean="0"/>
-          </a:p>
-          <a:p>
-            <a:r>
-              <a:rPr lang="en-US" sz="2400" dirty="0" smtClean="0"/>
-              <a:t>Create a graph database from traceroute data</a:t>
-            </a:r>
-          </a:p>
-          <a:p>
-            <a:r>
-              <a:rPr lang="en-US" sz="2400" dirty="0" smtClean="0"/>
-              <a:t>Select Atlas probes that are topologically near the target </a:t>
-            </a:r>
-            <a:endParaRPr lang="en-US" sz="2400" dirty="0"/>
-          </a:p>
-        </p:txBody>
-      </p:sp>
-      <p:sp>
-        <p:nvSpPr>
-          <p:cNvPr id="4" name="Slide Number Placeholder 3"/>
-          <p:cNvSpPr>
-            <a:spLocks noGrp="1"/>
-          </p:cNvSpPr>
-          <p:nvPr>
-            <p:ph type="sldNum" sz="quarter" idx="12"/>
-          </p:nvPr>
-        </p:nvSpPr>
-        <p:spPr/>
-        <p:txBody>
-          <a:bodyPr/>
-          <a:lstStyle/>
-          <a:p>
-            <a:fld id="{9FA1582C-DBF2-5B4A-97A2-C06F84193C12}" type="slidenum">
-              <a:rPr lang="en-US" smtClean="0"/>
-              <a:t>3</a:t>
-            </a:fld>
-            <a:endParaRPr lang="en-US"/>
-          </a:p>
-        </p:txBody>
-      </p:sp>
-      <p:pic>
-        <p:nvPicPr>
-          <p:cNvPr id="5" name="Picture 4" descr="routing-topology.png"/>
-          <p:cNvPicPr>
-            <a:picLocks noChangeAspect="1"/>
-          </p:cNvPicPr>
-          <p:nvPr/>
-        </p:nvPicPr>
-        <p:blipFill>
-          <a:blip r:embed="rId2">
-            <a:extLst>
-              <a:ext uri="{28A0092B-C50C-407E-A947-70E740481C1C}">
-                <a14:useLocalDpi xmlns:a14="http://schemas.microsoft.com/office/drawing/2010/main" val="0"/>
-              </a:ext>
-            </a:extLst>
-          </a:blip>
-          <a:stretch>
-            <a:fillRect/>
-          </a:stretch>
-        </p:blipFill>
-        <p:spPr>
-          <a:xfrm>
-            <a:off x="2165504" y="1383145"/>
-            <a:ext cx="4769590" cy="4114054"/>
-          </a:xfrm>
-          <a:prstGeom prst="rect">
-            <a:avLst/>
-          </a:prstGeom>
-        </p:spPr>
-      </p:pic>
-    </p:spTree>
-    <p:extLst>
-      <p:ext uri="{BB962C8B-B14F-4D97-AF65-F5344CB8AC3E}">
-        <p14:creationId xmlns:p14="http://schemas.microsoft.com/office/powerpoint/2010/main" val="1457431036"/>
       </p:ext>
     </p:extLst>
   </p:cSld>

</xml_diff>